<commit_message>
Loss reduction changed from sum to mean.
</commit_message>
<xml_diff>
--- a/docs/proj4_report.pptx
+++ b/docs/proj4_report.pptx
@@ -277,7 +277,7 @@
 <file path=ppt/revisionInfo.xml><?xml version="1.0" encoding="utf-8"?>
 <p1510:revInfo xmlns:a="http://schemas.openxmlformats.org/drawingml/2006/main" xmlns:r="http://schemas.openxmlformats.org/officeDocument/2006/relationships" xmlns:p1510="http://schemas.microsoft.com/office/powerpoint/2015/10/main">
   <p1510:revLst>
-    <p1510:client id="{7976DB38-3065-4BA1-91BF-A1048E1F5D4F}" v="190" dt="2022-11-12T05:46:41.240"/>
+    <p1510:client id="{7976DB38-3065-4BA1-91BF-A1048E1F5D4F}" v="322" dt="2022-11-13T01:37:38.429"/>
   </p1510:revLst>
 </p1510:revInfo>
 </file>
@@ -287,7 +287,7 @@
   <pc:docChgLst>
     <pc:chgData name="Newaz, Shuvo" userId="4c2373e7-346f-4797-94d1-ef2a1d69f094" providerId="ADAL" clId="{7976DB38-3065-4BA1-91BF-A1048E1F5D4F}"/>
     <pc:docChg chg="undo custSel addSld modSld">
-      <pc:chgData name="Newaz, Shuvo" userId="4c2373e7-346f-4797-94d1-ef2a1d69f094" providerId="ADAL" clId="{7976DB38-3065-4BA1-91BF-A1048E1F5D4F}" dt="2022-11-12T05:53:45.832" v="3288" actId="20577"/>
+      <pc:chgData name="Newaz, Shuvo" userId="4c2373e7-346f-4797-94d1-ef2a1d69f094" providerId="ADAL" clId="{7976DB38-3065-4BA1-91BF-A1048E1F5D4F}" dt="2022-11-13T01:37:38.425" v="3550" actId="20577"/>
       <pc:docMkLst>
         <pc:docMk/>
       </pc:docMkLst>
@@ -307,13 +307,13 @@
         </pc:spChg>
       </pc:sldChg>
       <pc:sldChg chg="addSp delSp modSp mod">
-        <pc:chgData name="Newaz, Shuvo" userId="4c2373e7-346f-4797-94d1-ef2a1d69f094" providerId="ADAL" clId="{7976DB38-3065-4BA1-91BF-A1048E1F5D4F}" dt="2022-11-12T04:52:43.574" v="1570" actId="20577"/>
+        <pc:chgData name="Newaz, Shuvo" userId="4c2373e7-346f-4797-94d1-ef2a1d69f094" providerId="ADAL" clId="{7976DB38-3065-4BA1-91BF-A1048E1F5D4F}" dt="2022-11-13T00:36:39.883" v="3323" actId="20577"/>
         <pc:sldMkLst>
           <pc:docMk/>
           <pc:sldMk cId="0" sldId="257"/>
         </pc:sldMkLst>
         <pc:spChg chg="mod">
-          <ac:chgData name="Newaz, Shuvo" userId="4c2373e7-346f-4797-94d1-ef2a1d69f094" providerId="ADAL" clId="{7976DB38-3065-4BA1-91BF-A1048E1F5D4F}" dt="2022-11-12T04:52:43.574" v="1570" actId="20577"/>
+          <ac:chgData name="Newaz, Shuvo" userId="4c2373e7-346f-4797-94d1-ef2a1d69f094" providerId="ADAL" clId="{7976DB38-3065-4BA1-91BF-A1048E1F5D4F}" dt="2022-11-13T00:36:39.883" v="3323" actId="20577"/>
           <ac:spMkLst>
             <pc:docMk/>
             <pc:sldMk cId="0" sldId="257"/>
@@ -328,12 +328,28 @@
             <ac:picMk id="3" creationId="{7FC49F9A-A119-6FEC-6D46-2FE2FFE244A2}"/>
           </ac:picMkLst>
         </pc:picChg>
+        <pc:picChg chg="add mod">
+          <ac:chgData name="Newaz, Shuvo" userId="4c2373e7-346f-4797-94d1-ef2a1d69f094" providerId="ADAL" clId="{7976DB38-3065-4BA1-91BF-A1048E1F5D4F}" dt="2022-11-13T00:36:05.221" v="3310" actId="14100"/>
+          <ac:picMkLst>
+            <pc:docMk/>
+            <pc:sldMk cId="0" sldId="257"/>
+            <ac:picMk id="3" creationId="{888BDF4F-B53C-5A16-1786-1915FD4F81F4}"/>
+          </ac:picMkLst>
+        </pc:picChg>
         <pc:picChg chg="add del mod">
           <ac:chgData name="Newaz, Shuvo" userId="4c2373e7-346f-4797-94d1-ef2a1d69f094" providerId="ADAL" clId="{7976DB38-3065-4BA1-91BF-A1048E1F5D4F}" dt="2022-11-12T02:05:27.861" v="751"/>
           <ac:picMkLst>
             <pc:docMk/>
             <pc:sldMk cId="0" sldId="257"/>
             <ac:picMk id="4" creationId="{860FDA44-4155-694B-0FC7-DD3DB3CD9F64}"/>
+          </ac:picMkLst>
+        </pc:picChg>
+        <pc:picChg chg="add mod">
+          <ac:chgData name="Newaz, Shuvo" userId="4c2373e7-346f-4797-94d1-ef2a1d69f094" providerId="ADAL" clId="{7976DB38-3065-4BA1-91BF-A1048E1F5D4F}" dt="2022-11-13T00:36:20.671" v="3315" actId="14100"/>
+          <ac:picMkLst>
+            <pc:docMk/>
+            <pc:sldMk cId="0" sldId="257"/>
+            <ac:picMk id="5" creationId="{19FF173E-F2D6-2741-E3E8-B8E7EC2BE6A9}"/>
           </ac:picMkLst>
         </pc:picChg>
         <pc:picChg chg="add del mod">
@@ -344,16 +360,16 @@
             <ac:picMk id="6" creationId="{BEE8C04E-EA9B-3B4E-E5E4-480A625539FC}"/>
           </ac:picMkLst>
         </pc:picChg>
-        <pc:picChg chg="add mod">
-          <ac:chgData name="Newaz, Shuvo" userId="4c2373e7-346f-4797-94d1-ef2a1d69f094" providerId="ADAL" clId="{7976DB38-3065-4BA1-91BF-A1048E1F5D4F}" dt="2022-11-12T02:32:08.605" v="811" actId="14100"/>
+        <pc:picChg chg="add del mod">
+          <ac:chgData name="Newaz, Shuvo" userId="4c2373e7-346f-4797-94d1-ef2a1d69f094" providerId="ADAL" clId="{7976DB38-3065-4BA1-91BF-A1048E1F5D4F}" dt="2022-11-13T00:35:54.579" v="3306" actId="478"/>
           <ac:picMkLst>
             <pc:docMk/>
             <pc:sldMk cId="0" sldId="257"/>
             <ac:picMk id="8" creationId="{0AA74CFB-38CB-EC14-D8F7-5D566842B06B}"/>
           </ac:picMkLst>
         </pc:picChg>
-        <pc:picChg chg="add mod">
-          <ac:chgData name="Newaz, Shuvo" userId="4c2373e7-346f-4797-94d1-ef2a1d69f094" providerId="ADAL" clId="{7976DB38-3065-4BA1-91BF-A1048E1F5D4F}" dt="2022-11-12T02:32:25.256" v="816" actId="1076"/>
+        <pc:picChg chg="add del mod">
+          <ac:chgData name="Newaz, Shuvo" userId="4c2373e7-346f-4797-94d1-ef2a1d69f094" providerId="ADAL" clId="{7976DB38-3065-4BA1-91BF-A1048E1F5D4F}" dt="2022-11-13T00:36:10.801" v="3311" actId="478"/>
           <ac:picMkLst>
             <pc:docMk/>
             <pc:sldMk cId="0" sldId="257"/>
@@ -362,13 +378,21 @@
         </pc:picChg>
       </pc:sldChg>
       <pc:sldChg chg="modSp mod">
-        <pc:chgData name="Newaz, Shuvo" userId="4c2373e7-346f-4797-94d1-ef2a1d69f094" providerId="ADAL" clId="{7976DB38-3065-4BA1-91BF-A1048E1F5D4F}" dt="2022-11-12T04:22:01.882" v="929" actId="20577"/>
+        <pc:chgData name="Newaz, Shuvo" userId="4c2373e7-346f-4797-94d1-ef2a1d69f094" providerId="ADAL" clId="{7976DB38-3065-4BA1-91BF-A1048E1F5D4F}" dt="2022-11-13T01:21:08.378" v="3466" actId="20577"/>
         <pc:sldMkLst>
           <pc:docMk/>
           <pc:sldMk cId="0" sldId="258"/>
         </pc:sldMkLst>
+        <pc:spChg chg="mod">
+          <ac:chgData name="Newaz, Shuvo" userId="4c2373e7-346f-4797-94d1-ef2a1d69f094" providerId="ADAL" clId="{7976DB38-3065-4BA1-91BF-A1048E1F5D4F}" dt="2022-11-13T01:01:25.771" v="3438" actId="14100"/>
+          <ac:spMkLst>
+            <pc:docMk/>
+            <pc:sldMk cId="0" sldId="258"/>
+            <ac:spMk id="68" creationId="{00000000-0000-0000-0000-000000000000}"/>
+          </ac:spMkLst>
+        </pc:spChg>
         <pc:graphicFrameChg chg="mod modGraphic">
-          <ac:chgData name="Newaz, Shuvo" userId="4c2373e7-346f-4797-94d1-ef2a1d69f094" providerId="ADAL" clId="{7976DB38-3065-4BA1-91BF-A1048E1F5D4F}" dt="2022-11-12T04:22:01.882" v="929" actId="20577"/>
+          <ac:chgData name="Newaz, Shuvo" userId="4c2373e7-346f-4797-94d1-ef2a1d69f094" providerId="ADAL" clId="{7976DB38-3065-4BA1-91BF-A1048E1F5D4F}" dt="2022-11-13T01:21:08.378" v="3466" actId="20577"/>
           <ac:graphicFrameMkLst>
             <pc:docMk/>
             <pc:sldMk cId="0" sldId="258"/>
@@ -377,13 +401,13 @@
         </pc:graphicFrameChg>
       </pc:sldChg>
       <pc:sldChg chg="addSp delSp modSp mod">
-        <pc:chgData name="Newaz, Shuvo" userId="4c2373e7-346f-4797-94d1-ef2a1d69f094" providerId="ADAL" clId="{7976DB38-3065-4BA1-91BF-A1048E1F5D4F}" dt="2022-11-12T04:52:46.038" v="1571" actId="20577"/>
+        <pc:chgData name="Newaz, Shuvo" userId="4c2373e7-346f-4797-94d1-ef2a1d69f094" providerId="ADAL" clId="{7976DB38-3065-4BA1-91BF-A1048E1F5D4F}" dt="2022-11-13T01:28:57.730" v="3474" actId="20577"/>
         <pc:sldMkLst>
           <pc:docMk/>
           <pc:sldMk cId="0" sldId="259"/>
         </pc:sldMkLst>
         <pc:spChg chg="mod">
-          <ac:chgData name="Newaz, Shuvo" userId="4c2373e7-346f-4797-94d1-ef2a1d69f094" providerId="ADAL" clId="{7976DB38-3065-4BA1-91BF-A1048E1F5D4F}" dt="2022-11-12T04:52:46.038" v="1571" actId="20577"/>
+          <ac:chgData name="Newaz, Shuvo" userId="4c2373e7-346f-4797-94d1-ef2a1d69f094" providerId="ADAL" clId="{7976DB38-3065-4BA1-91BF-A1048E1F5D4F}" dt="2022-11-13T01:28:57.730" v="3474" actId="20577"/>
           <ac:spMkLst>
             <pc:docMk/>
             <pc:sldMk cId="0" sldId="259"/>
@@ -399,7 +423,15 @@
           </ac:picMkLst>
         </pc:picChg>
         <pc:picChg chg="add mod">
-          <ac:chgData name="Newaz, Shuvo" userId="4c2373e7-346f-4797-94d1-ef2a1d69f094" providerId="ADAL" clId="{7976DB38-3065-4BA1-91BF-A1048E1F5D4F}" dt="2022-11-12T04:22:47.597" v="944" actId="14100"/>
+          <ac:chgData name="Newaz, Shuvo" userId="4c2373e7-346f-4797-94d1-ef2a1d69f094" providerId="ADAL" clId="{7976DB38-3065-4BA1-91BF-A1048E1F5D4F}" dt="2022-11-13T01:13:58.417" v="3447" actId="14100"/>
+          <ac:picMkLst>
+            <pc:docMk/>
+            <pc:sldMk cId="0" sldId="259"/>
+            <ac:picMk id="3" creationId="{ED1850BC-C9B2-2AD7-1770-95F2EFCC2DE5}"/>
+          </ac:picMkLst>
+        </pc:picChg>
+        <pc:picChg chg="add del mod">
+          <ac:chgData name="Newaz, Shuvo" userId="4c2373e7-346f-4797-94d1-ef2a1d69f094" providerId="ADAL" clId="{7976DB38-3065-4BA1-91BF-A1048E1F5D4F}" dt="2022-11-13T01:13:48.274" v="3443" actId="478"/>
           <ac:picMkLst>
             <pc:docMk/>
             <pc:sldMk cId="0" sldId="259"/>
@@ -415,7 +447,15 @@
           </ac:picMkLst>
         </pc:picChg>
         <pc:picChg chg="add mod">
-          <ac:chgData name="Newaz, Shuvo" userId="4c2373e7-346f-4797-94d1-ef2a1d69f094" providerId="ADAL" clId="{7976DB38-3065-4BA1-91BF-A1048E1F5D4F}" dt="2022-11-12T04:22:49.613" v="945" actId="14100"/>
+          <ac:chgData name="Newaz, Shuvo" userId="4c2373e7-346f-4797-94d1-ef2a1d69f094" providerId="ADAL" clId="{7976DB38-3065-4BA1-91BF-A1048E1F5D4F}" dt="2022-11-13T01:14:20.874" v="3456" actId="1076"/>
+          <ac:picMkLst>
+            <pc:docMk/>
+            <pc:sldMk cId="0" sldId="259"/>
+            <ac:picMk id="6" creationId="{B5C121B7-2CEB-A3AD-32F4-3B4A35973E1C}"/>
+          </ac:picMkLst>
+        </pc:picChg>
+        <pc:picChg chg="add del mod">
+          <ac:chgData name="Newaz, Shuvo" userId="4c2373e7-346f-4797-94d1-ef2a1d69f094" providerId="ADAL" clId="{7976DB38-3065-4BA1-91BF-A1048E1F5D4F}" dt="2022-11-13T01:14:06.522" v="3448" actId="478"/>
           <ac:picMkLst>
             <pc:docMk/>
             <pc:sldMk cId="0" sldId="259"/>
@@ -470,19 +510,27 @@
         </pc:spChg>
       </pc:sldChg>
       <pc:sldChg chg="addSp delSp modSp mod">
-        <pc:chgData name="Newaz, Shuvo" userId="4c2373e7-346f-4797-94d1-ef2a1d69f094" providerId="ADAL" clId="{7976DB38-3065-4BA1-91BF-A1048E1F5D4F}" dt="2022-11-12T04:46:24.324" v="1560" actId="20577"/>
+        <pc:chgData name="Newaz, Shuvo" userId="4c2373e7-346f-4797-94d1-ef2a1d69f094" providerId="ADAL" clId="{7976DB38-3065-4BA1-91BF-A1048E1F5D4F}" dt="2022-11-13T01:33:08.515" v="3492" actId="20577"/>
         <pc:sldMkLst>
           <pc:docMk/>
           <pc:sldMk cId="0" sldId="262"/>
         </pc:sldMkLst>
         <pc:spChg chg="mod">
-          <ac:chgData name="Newaz, Shuvo" userId="4c2373e7-346f-4797-94d1-ef2a1d69f094" providerId="ADAL" clId="{7976DB38-3065-4BA1-91BF-A1048E1F5D4F}" dt="2022-11-12T04:46:24.324" v="1560" actId="20577"/>
+          <ac:chgData name="Newaz, Shuvo" userId="4c2373e7-346f-4797-94d1-ef2a1d69f094" providerId="ADAL" clId="{7976DB38-3065-4BA1-91BF-A1048E1F5D4F}" dt="2022-11-13T01:33:08.515" v="3492" actId="20577"/>
           <ac:spMkLst>
             <pc:docMk/>
             <pc:sldMk cId="0" sldId="262"/>
             <ac:spMk id="96" creationId="{00000000-0000-0000-0000-000000000000}"/>
           </ac:spMkLst>
         </pc:spChg>
+        <pc:picChg chg="add mod">
+          <ac:chgData name="Newaz, Shuvo" userId="4c2373e7-346f-4797-94d1-ef2a1d69f094" providerId="ADAL" clId="{7976DB38-3065-4BA1-91BF-A1048E1F5D4F}" dt="2022-11-13T01:32:35.860" v="3482" actId="14100"/>
+          <ac:picMkLst>
+            <pc:docMk/>
+            <pc:sldMk cId="0" sldId="262"/>
+            <ac:picMk id="3" creationId="{1791E5E5-63CD-391C-397D-23556049A38C}"/>
+          </ac:picMkLst>
+        </pc:picChg>
         <pc:picChg chg="add del mod">
           <ac:chgData name="Newaz, Shuvo" userId="4c2373e7-346f-4797-94d1-ef2a1d69f094" providerId="ADAL" clId="{7976DB38-3065-4BA1-91BF-A1048E1F5D4F}" dt="2022-11-12T04:45:41.024" v="1535" actId="478"/>
           <ac:picMkLst>
@@ -491,8 +539,8 @@
             <ac:picMk id="3" creationId="{AC93D96A-D4E5-6CDF-3B9D-966C36D4EB15}"/>
           </ac:picMkLst>
         </pc:picChg>
-        <pc:picChg chg="add mod">
-          <ac:chgData name="Newaz, Shuvo" userId="4c2373e7-346f-4797-94d1-ef2a1d69f094" providerId="ADAL" clId="{7976DB38-3065-4BA1-91BF-A1048E1F5D4F}" dt="2022-11-12T04:45:46.776" v="1538" actId="1076"/>
+        <pc:picChg chg="add del mod">
+          <ac:chgData name="Newaz, Shuvo" userId="4c2373e7-346f-4797-94d1-ef2a1d69f094" providerId="ADAL" clId="{7976DB38-3065-4BA1-91BF-A1048E1F5D4F}" dt="2022-11-13T01:32:20.855" v="3475" actId="478"/>
           <ac:picMkLst>
             <pc:docMk/>
             <pc:sldMk cId="0" sldId="262"/>
@@ -508,7 +556,15 @@
           </ac:picMkLst>
         </pc:picChg>
         <pc:picChg chg="add mod">
-          <ac:chgData name="Newaz, Shuvo" userId="4c2373e7-346f-4797-94d1-ef2a1d69f094" providerId="ADAL" clId="{7976DB38-3065-4BA1-91BF-A1048E1F5D4F}" dt="2022-11-12T04:46:05.092" v="1544" actId="14100"/>
+          <ac:chgData name="Newaz, Shuvo" userId="4c2373e7-346f-4797-94d1-ef2a1d69f094" providerId="ADAL" clId="{7976DB38-3065-4BA1-91BF-A1048E1F5D4F}" dt="2022-11-13T01:32:54.690" v="3490" actId="1076"/>
+          <ac:picMkLst>
+            <pc:docMk/>
+            <pc:sldMk cId="0" sldId="262"/>
+            <ac:picMk id="6" creationId="{DAE2C52F-5B07-8C73-8F1D-C527988C2E30}"/>
+          </ac:picMkLst>
+        </pc:picChg>
+        <pc:picChg chg="add del mod">
+          <ac:chgData name="Newaz, Shuvo" userId="4c2373e7-346f-4797-94d1-ef2a1d69f094" providerId="ADAL" clId="{7976DB38-3065-4BA1-91BF-A1048E1F5D4F}" dt="2022-11-13T01:32:42.432" v="3483" actId="478"/>
           <ac:picMkLst>
             <pc:docMk/>
             <pc:sldMk cId="0" sldId="262"/>
@@ -548,13 +604,13 @@
         </pc:picChg>
       </pc:sldChg>
       <pc:sldChg chg="addSp delSp modSp mod">
-        <pc:chgData name="Newaz, Shuvo" userId="4c2373e7-346f-4797-94d1-ef2a1d69f094" providerId="ADAL" clId="{7976DB38-3065-4BA1-91BF-A1048E1F5D4F}" dt="2022-11-12T05:08:53.864" v="1974" actId="20577"/>
+        <pc:chgData name="Newaz, Shuvo" userId="4c2373e7-346f-4797-94d1-ef2a1d69f094" providerId="ADAL" clId="{7976DB38-3065-4BA1-91BF-A1048E1F5D4F}" dt="2022-11-13T00:32:31.414" v="3305" actId="123"/>
         <pc:sldMkLst>
           <pc:docMk/>
           <pc:sldMk cId="0" sldId="264"/>
         </pc:sldMkLst>
         <pc:spChg chg="mod">
-          <ac:chgData name="Newaz, Shuvo" userId="4c2373e7-346f-4797-94d1-ef2a1d69f094" providerId="ADAL" clId="{7976DB38-3065-4BA1-91BF-A1048E1F5D4F}" dt="2022-11-12T05:08:53.864" v="1974" actId="20577"/>
+          <ac:chgData name="Newaz, Shuvo" userId="4c2373e7-346f-4797-94d1-ef2a1d69f094" providerId="ADAL" clId="{7976DB38-3065-4BA1-91BF-A1048E1F5D4F}" dt="2022-11-13T00:32:31.414" v="3305" actId="123"/>
           <ac:spMkLst>
             <pc:docMk/>
             <pc:sldMk cId="0" sldId="264"/>
@@ -571,7 +627,7 @@
         </pc:picChg>
       </pc:sldChg>
       <pc:sldChg chg="modSp mod">
-        <pc:chgData name="Newaz, Shuvo" userId="4c2373e7-346f-4797-94d1-ef2a1d69f094" providerId="ADAL" clId="{7976DB38-3065-4BA1-91BF-A1048E1F5D4F}" dt="2022-11-12T05:53:45.832" v="3288" actId="20577"/>
+        <pc:chgData name="Newaz, Shuvo" userId="4c2373e7-346f-4797-94d1-ef2a1d69f094" providerId="ADAL" clId="{7976DB38-3065-4BA1-91BF-A1048E1F5D4F}" dt="2022-11-13T01:35:26.486" v="3536" actId="20577"/>
         <pc:sldMkLst>
           <pc:docMk/>
           <pc:sldMk cId="0" sldId="265"/>
@@ -585,7 +641,7 @@
           </ac:spMkLst>
         </pc:spChg>
         <pc:spChg chg="mod">
-          <ac:chgData name="Newaz, Shuvo" userId="4c2373e7-346f-4797-94d1-ef2a1d69f094" providerId="ADAL" clId="{7976DB38-3065-4BA1-91BF-A1048E1F5D4F}" dt="2022-11-12T05:53:00.113" v="3243" actId="20577"/>
+          <ac:chgData name="Newaz, Shuvo" userId="4c2373e7-346f-4797-94d1-ef2a1d69f094" providerId="ADAL" clId="{7976DB38-3065-4BA1-91BF-A1048E1F5D4F}" dt="2022-11-13T01:35:26.486" v="3536" actId="20577"/>
           <ac:spMkLst>
             <pc:docMk/>
             <pc:sldMk cId="0" sldId="265"/>
@@ -617,13 +673,13 @@
         </pc:spChg>
       </pc:sldChg>
       <pc:sldChg chg="addSp delSp modSp mod">
-        <pc:chgData name="Newaz, Shuvo" userId="4c2373e7-346f-4797-94d1-ef2a1d69f094" providerId="ADAL" clId="{7976DB38-3065-4BA1-91BF-A1048E1F5D4F}" dt="2022-11-12T05:25:50.415" v="2579" actId="478"/>
+        <pc:chgData name="Newaz, Shuvo" userId="4c2373e7-346f-4797-94d1-ef2a1d69f094" providerId="ADAL" clId="{7976DB38-3065-4BA1-91BF-A1048E1F5D4F}" dt="2022-11-13T01:37:38.425" v="3550" actId="20577"/>
         <pc:sldMkLst>
           <pc:docMk/>
           <pc:sldMk cId="1098754398" sldId="268"/>
         </pc:sldMkLst>
         <pc:spChg chg="mod">
-          <ac:chgData name="Newaz, Shuvo" userId="4c2373e7-346f-4797-94d1-ef2a1d69f094" providerId="ADAL" clId="{7976DB38-3065-4BA1-91BF-A1048E1F5D4F}" dt="2022-11-12T05:12:38.321" v="2002" actId="20577"/>
+          <ac:chgData name="Newaz, Shuvo" userId="4c2373e7-346f-4797-94d1-ef2a1d69f094" providerId="ADAL" clId="{7976DB38-3065-4BA1-91BF-A1048E1F5D4F}" dt="2022-11-13T01:37:38.425" v="3550" actId="20577"/>
           <ac:spMkLst>
             <pc:docMk/>
             <pc:sldMk cId="1098754398" sldId="268"/>
@@ -638,12 +694,28 @@
             <ac:picMk id="3" creationId="{4BFCF5AF-9B35-2ECC-CF97-169616EEC772}"/>
           </ac:picMkLst>
         </pc:picChg>
+        <pc:picChg chg="add mod">
+          <ac:chgData name="Newaz, Shuvo" userId="4c2373e7-346f-4797-94d1-ef2a1d69f094" providerId="ADAL" clId="{7976DB38-3065-4BA1-91BF-A1048E1F5D4F}" dt="2022-11-13T01:37:04.445" v="3541" actId="14100"/>
+          <ac:picMkLst>
+            <pc:docMk/>
+            <pc:sldMk cId="1098754398" sldId="268"/>
+            <ac:picMk id="3" creationId="{8A0B376A-FEB4-125F-71FD-A00382FE775A}"/>
+          </ac:picMkLst>
+        </pc:picChg>
         <pc:picChg chg="add del">
           <ac:chgData name="Newaz, Shuvo" userId="4c2373e7-346f-4797-94d1-ef2a1d69f094" providerId="ADAL" clId="{7976DB38-3065-4BA1-91BF-A1048E1F5D4F}" dt="2022-11-12T01:59:53.686" v="745" actId="22"/>
           <ac:picMkLst>
             <pc:docMk/>
             <pc:sldMk cId="1098754398" sldId="268"/>
             <ac:picMk id="4" creationId="{E5385444-E9CB-1686-AB7A-97A0D1CE7638}"/>
+          </ac:picMkLst>
+        </pc:picChg>
+        <pc:picChg chg="add mod">
+          <ac:chgData name="Newaz, Shuvo" userId="4c2373e7-346f-4797-94d1-ef2a1d69f094" providerId="ADAL" clId="{7976DB38-3065-4BA1-91BF-A1048E1F5D4F}" dt="2022-11-13T01:37:24.525" v="3547" actId="1076"/>
+          <ac:picMkLst>
+            <pc:docMk/>
+            <pc:sldMk cId="1098754398" sldId="268"/>
+            <ac:picMk id="5" creationId="{A14F4549-6C7F-57DB-06B2-A3C74C627DF5}"/>
           </ac:picMkLst>
         </pc:picChg>
         <pc:picChg chg="add del mod">
@@ -655,15 +727,15 @@
           </ac:picMkLst>
         </pc:picChg>
         <pc:picChg chg="add del mod">
-          <ac:chgData name="Newaz, Shuvo" userId="4c2373e7-346f-4797-94d1-ef2a1d69f094" providerId="ADAL" clId="{7976DB38-3065-4BA1-91BF-A1048E1F5D4F}" dt="2022-11-12T05:25:50.415" v="2579" actId="478"/>
+          <ac:chgData name="Newaz, Shuvo" userId="4c2373e7-346f-4797-94d1-ef2a1d69f094" providerId="ADAL" clId="{7976DB38-3065-4BA1-91BF-A1048E1F5D4F}" dt="2022-11-13T01:36:53.981" v="3537" actId="478"/>
           <ac:picMkLst>
             <pc:docMk/>
             <pc:sldMk cId="1098754398" sldId="268"/>
             <ac:picMk id="7" creationId="{A23E11E4-19A3-C7D3-4D71-93924A69696B}"/>
           </ac:picMkLst>
         </pc:picChg>
-        <pc:picChg chg="add mod">
-          <ac:chgData name="Newaz, Shuvo" userId="4c2373e7-346f-4797-94d1-ef2a1d69f094" providerId="ADAL" clId="{7976DB38-3065-4BA1-91BF-A1048E1F5D4F}" dt="2022-11-12T05:12:16.324" v="1985" actId="14100"/>
+        <pc:picChg chg="add del mod">
+          <ac:chgData name="Newaz, Shuvo" userId="4c2373e7-346f-4797-94d1-ef2a1d69f094" providerId="ADAL" clId="{7976DB38-3065-4BA1-91BF-A1048E1F5D4F}" dt="2022-11-13T01:37:11.553" v="3542" actId="478"/>
           <ac:picMkLst>
             <pc:docMk/>
             <pc:sldMk cId="1098754398" sldId="268"/>
@@ -11155,14 +11227,7 @@
                 <a:latin typeface="Cambria" panose="02040503050406030204" pitchFamily="18" charset="0"/>
                 <a:ea typeface="Cambria" panose="02040503050406030204" pitchFamily="18" charset="0"/>
               </a:rPr>
-              <a:t>It means to take a pre-trained network, freeze all the parameters except for the ones in the last (few) layers and train the model on the given database to get good parameter values for the data. In other words, fine-tune an already </a:t>
-            </a:r>
-            <a:r>
-              <a:rPr lang="en">
-                <a:latin typeface="Cambria" panose="02040503050406030204" pitchFamily="18" charset="0"/>
-                <a:ea typeface="Cambria" panose="02040503050406030204" pitchFamily="18" charset="0"/>
-              </a:rPr>
-              <a:t>adequate network to make it catered to the current database.</a:t>
+              <a:t>It means to take a pre-trained network, freeze all the parameters except for the ones in the last (few) layers and train the model on the given database to get good parameter values for the data. In other words, fine-tune an already adequate network to make it catered to the current database.</a:t>
             </a:r>
             <a:endParaRPr dirty="0">
               <a:latin typeface="Cambria" panose="02040503050406030204" pitchFamily="18" charset="0"/>
@@ -11225,7 +11290,7 @@
                 <a:latin typeface="Cambria" panose="02040503050406030204" pitchFamily="18" charset="0"/>
                 <a:ea typeface="Cambria" panose="02040503050406030204" pitchFamily="18" charset="0"/>
               </a:rPr>
-              <a:t>We want to freeze the conv layers to reduce computation as a result of trainng. The conv layers learn common features from images, so the layers trained on one set of images may be generalized on another set of images.</a:t>
+              <a:t>We want to freeze the conv layers to reduce computation as a result of training and to keep the parameter values unchanged. The conv layers learn common features from images, so the layers trained on one set of images may be generalized on another set of images.</a:t>
             </a:r>
             <a:endParaRPr dirty="0">
               <a:latin typeface="Cambria" panose="02040503050406030204" pitchFamily="18" charset="0"/>
@@ -11470,7 +11535,19 @@
                       <a:rPr lang="en-US" b="0" i="1" smtClean="0">
                         <a:latin typeface="Cambria Math" panose="02040503050406030204" pitchFamily="18" charset="0"/>
                       </a:rPr>
-                      <m:t>91.6%</m:t>
+                      <m:t>91.</m:t>
+                    </m:r>
+                    <m:r>
+                      <a:rPr lang="en-US" b="0" i="1" smtClean="0">
+                        <a:latin typeface="Cambria Math" panose="02040503050406030204" pitchFamily="18" charset="0"/>
+                      </a:rPr>
+                      <m:t>9</m:t>
+                    </m:r>
+                    <m:r>
+                      <a:rPr lang="en-US" b="0" i="1" smtClean="0">
+                        <a:latin typeface="Cambria Math" panose="02040503050406030204" pitchFamily="18" charset="0"/>
+                      </a:rPr>
+                      <m:t>%</m:t>
                     </m:r>
                   </m:oMath>
                 </a14:m>
@@ -11496,7 +11573,31 @@
                       <a:rPr lang="en-US" b="0" i="1" smtClean="0">
                         <a:latin typeface="Cambria Math" panose="02040503050406030204" pitchFamily="18" charset="0"/>
                       </a:rPr>
-                      <m:t>90.7%</m:t>
+                      <m:t>9</m:t>
+                    </m:r>
+                    <m:r>
+                      <a:rPr lang="en-US" b="0" i="1" smtClean="0">
+                        <a:latin typeface="Cambria Math" panose="02040503050406030204" pitchFamily="18" charset="0"/>
+                      </a:rPr>
+                      <m:t>1</m:t>
+                    </m:r>
+                    <m:r>
+                      <a:rPr lang="en-US" b="0" i="1" smtClean="0">
+                        <a:latin typeface="Cambria Math" panose="02040503050406030204" pitchFamily="18" charset="0"/>
+                      </a:rPr>
+                      <m:t>.</m:t>
+                    </m:r>
+                    <m:r>
+                      <a:rPr lang="en-US" b="0" i="1" smtClean="0">
+                        <a:latin typeface="Cambria Math" panose="02040503050406030204" pitchFamily="18" charset="0"/>
+                      </a:rPr>
+                      <m:t>1</m:t>
+                    </m:r>
+                    <m:r>
+                      <a:rPr lang="en-US" b="0" i="1" smtClean="0">
+                        <a:latin typeface="Cambria Math" panose="02040503050406030204" pitchFamily="18" charset="0"/>
+                      </a:rPr>
+                      <m:t>%</m:t>
                     </m:r>
                   </m:oMath>
                 </a14:m>
@@ -11590,10 +11691,10 @@
       </p:sp>
       <p:pic>
         <p:nvPicPr>
-          <p:cNvPr id="7" name="Picture 6">
+          <p:cNvPr id="3" name="Picture 2">
             <a:extLst>
               <a:ext uri="{FF2B5EF4-FFF2-40B4-BE49-F238E27FC236}">
-                <a16:creationId xmlns:a16="http://schemas.microsoft.com/office/drawing/2014/main" id="{A23E11E4-19A3-C7D3-4D71-93924A69696B}"/>
+                <a16:creationId xmlns:a16="http://schemas.microsoft.com/office/drawing/2014/main" id="{8A0B376A-FEB4-125F-71FD-A00382FE775A}"/>
               </a:ext>
             </a:extLst>
           </p:cNvPr>
@@ -11610,8 +11711,8 @@
         </p:blipFill>
         <p:spPr>
           <a:xfrm>
-            <a:off x="311700" y="1478678"/>
-            <a:ext cx="2726482" cy="2178300"/>
+            <a:off x="335154" y="1478679"/>
+            <a:ext cx="2805611" cy="2172550"/>
           </a:xfrm>
           <a:prstGeom prst="rect">
             <a:avLst/>
@@ -11620,10 +11721,10 @@
       </p:pic>
       <p:pic>
         <p:nvPicPr>
-          <p:cNvPr id="9" name="Picture 8">
+          <p:cNvPr id="5" name="Picture 4">
             <a:extLst>
               <a:ext uri="{FF2B5EF4-FFF2-40B4-BE49-F238E27FC236}">
-                <a16:creationId xmlns:a16="http://schemas.microsoft.com/office/drawing/2014/main" id="{CEE863FD-29FA-E150-CCA7-F2CFA9649C2B}"/>
+                <a16:creationId xmlns:a16="http://schemas.microsoft.com/office/drawing/2014/main" id="{A14F4549-6C7F-57DB-06B2-A3C74C627DF5}"/>
               </a:ext>
             </a:extLst>
           </p:cNvPr>
@@ -11640,8 +11741,8 @@
         </p:blipFill>
         <p:spPr>
           <a:xfrm>
-            <a:off x="4437888" y="1478678"/>
-            <a:ext cx="2769759" cy="2178300"/>
+            <a:off x="4407941" y="1478679"/>
+            <a:ext cx="2761485" cy="2171793"/>
           </a:xfrm>
           <a:prstGeom prst="rect">
             <a:avLst/>
@@ -11994,8 +12095,8 @@
           </a:p>
         </p:txBody>
       </p:sp>
-      <mc:AlternateContent xmlns:mc="http://schemas.openxmlformats.org/markup-compatibility/2006">
-        <mc:Choice xmlns:a14="http://schemas.microsoft.com/office/drawing/2010/main" Requires="a14">
+      <mc:AlternateContent xmlns:mc="http://schemas.openxmlformats.org/markup-compatibility/2006" xmlns:a14="http://schemas.microsoft.com/office/drawing/2010/main">
+        <mc:Choice Requires="a14">
           <p:sp>
             <p:nvSpPr>
               <p:cNvPr id="116" name="Google Shape;116;p22"/>
@@ -12078,7 +12179,7 @@
             </p:txBody>
           </p:sp>
         </mc:Choice>
-        <mc:Fallback>
+        <mc:Fallback xmlns="">
           <p:sp>
             <p:nvSpPr>
               <p:cNvPr id="116" name="Google Shape;116;p22"/>
@@ -12486,18 +12587,11 @@
                 <a14:m>
                   <m:oMath xmlns:m="http://schemas.openxmlformats.org/officeDocument/2006/math">
                     <m:r>
-                      <a:rPr lang="en-US" i="1" dirty="0" smtClean="0">
-                        <a:latin typeface="Cambria Math" panose="02040503050406030204" pitchFamily="18" charset="0"/>
-                        <a:ea typeface="Cambria" panose="02040503050406030204" pitchFamily="18" charset="0"/>
-                      </a:rPr>
-                      <m:t>7</m:t>
-                    </m:r>
-                    <m:r>
                       <a:rPr lang="en-US" b="0" i="1" dirty="0" smtClean="0">
                         <a:latin typeface="Cambria Math" panose="02040503050406030204" pitchFamily="18" charset="0"/>
                         <a:ea typeface="Cambria" panose="02040503050406030204" pitchFamily="18" charset="0"/>
                       </a:rPr>
-                      <m:t>5.9</m:t>
+                      <m:t>62.6</m:t>
                     </m:r>
                     <m:r>
                       <a:rPr lang="en-US" i="1" dirty="0" smtClean="0">
@@ -12527,25 +12621,18 @@
                 <a14:m>
                   <m:oMath xmlns:m="http://schemas.openxmlformats.org/officeDocument/2006/math">
                     <m:r>
-                      <a:rPr lang="en-US" i="1" dirty="0" smtClean="0">
-                        <a:latin typeface="Cambria Math" panose="02040503050406030204" pitchFamily="18" charset="0"/>
-                        <a:ea typeface="Cambria" panose="02040503050406030204" pitchFamily="18" charset="0"/>
-                      </a:rPr>
-                      <m:t>5</m:t>
-                    </m:r>
-                    <m:r>
                       <a:rPr lang="en-US" b="0" i="1" dirty="0" smtClean="0">
                         <a:latin typeface="Cambria Math" panose="02040503050406030204" pitchFamily="18" charset="0"/>
                         <a:ea typeface="Cambria" panose="02040503050406030204" pitchFamily="18" charset="0"/>
                       </a:rPr>
-                      <m:t>4</m:t>
+                      <m:t>48.4</m:t>
                     </m:r>
                     <m:r>
                       <a:rPr lang="en-US" i="1" dirty="0" smtClean="0">
                         <a:latin typeface="Cambria Math" panose="02040503050406030204" pitchFamily="18" charset="0"/>
                         <a:ea typeface="Cambria" panose="02040503050406030204" pitchFamily="18" charset="0"/>
                       </a:rPr>
-                      <m:t>.8%</m:t>
+                      <m:t>%</m:t>
                     </m:r>
                   </m:oMath>
                 </a14:m>
@@ -12642,10 +12729,10 @@
       </p:sp>
       <p:pic>
         <p:nvPicPr>
-          <p:cNvPr id="8" name="Picture 7">
+          <p:cNvPr id="3" name="Picture 2">
             <a:extLst>
               <a:ext uri="{FF2B5EF4-FFF2-40B4-BE49-F238E27FC236}">
-                <a16:creationId xmlns:a16="http://schemas.microsoft.com/office/drawing/2014/main" id="{0AA74CFB-38CB-EC14-D8F7-5D566842B06B}"/>
+                <a16:creationId xmlns:a16="http://schemas.microsoft.com/office/drawing/2014/main" id="{888BDF4F-B53C-5A16-1786-1915FD4F81F4}"/>
               </a:ext>
             </a:extLst>
           </p:cNvPr>
@@ -12662,8 +12749,8 @@
         </p:blipFill>
         <p:spPr>
           <a:xfrm>
-            <a:off x="357822" y="1493044"/>
-            <a:ext cx="2738946" cy="2154066"/>
+            <a:off x="404190" y="1489698"/>
+            <a:ext cx="2743199" cy="2157412"/>
           </a:xfrm>
           <a:prstGeom prst="rect">
             <a:avLst/>
@@ -12672,10 +12759,10 @@
       </p:pic>
       <p:pic>
         <p:nvPicPr>
-          <p:cNvPr id="10" name="Picture 9">
+          <p:cNvPr id="5" name="Picture 4">
             <a:extLst>
               <a:ext uri="{FF2B5EF4-FFF2-40B4-BE49-F238E27FC236}">
-                <a16:creationId xmlns:a16="http://schemas.microsoft.com/office/drawing/2014/main" id="{4CEB5071-53DD-76EA-A00D-4AABD0682085}"/>
+                <a16:creationId xmlns:a16="http://schemas.microsoft.com/office/drawing/2014/main" id="{19FF173E-F2D6-2741-E3E8-B8E7EC2BE6A9}"/>
               </a:ext>
             </a:extLst>
           </p:cNvPr>
@@ -12692,8 +12779,8 @@
         </p:blipFill>
         <p:spPr>
           <a:xfrm>
-            <a:off x="5120640" y="1489698"/>
-            <a:ext cx="2700337" cy="2157412"/>
+            <a:off x="5141842" y="1489699"/>
+            <a:ext cx="2693711" cy="2152118"/>
           </a:xfrm>
           <a:prstGeom prst="rect">
             <a:avLst/>
@@ -12779,8 +12866,8 @@
         </p:nvSpPr>
         <p:spPr>
           <a:xfrm>
-            <a:off x="311700" y="1152475"/>
-            <a:ext cx="8520600" cy="3416400"/>
+            <a:off x="311700" y="1033395"/>
+            <a:ext cx="8520600" cy="520907"/>
           </a:xfrm>
           <a:prstGeom prst="rect">
             <a:avLst/>
@@ -12802,10 +12889,10 @@
               <a:buNone/>
             </a:pPr>
             <a:r>
-              <a:rPr lang="en"/>
+              <a:rPr lang="en" dirty="0"/>
               <a:t>Add each of the following (keeping the changes as you move to the next row):</a:t>
             </a:r>
-            <a:endParaRPr/>
+            <a:endParaRPr dirty="0"/>
           </a:p>
         </p:txBody>
       </p:sp>
@@ -12818,14 +12905,14 @@
               <p:nvPr>
                 <p:extLst>
                   <p:ext uri="{D42A27DB-BD31-4B8C-83A1-F6EECF244321}">
-                    <p14:modId xmlns:p14="http://schemas.microsoft.com/office/powerpoint/2010/main" val="1709444507"/>
+                    <p14:modId xmlns:p14="http://schemas.microsoft.com/office/powerpoint/2010/main" val="3667458864"/>
                   </p:ext>
                 </p:extLst>
               </p:nvPr>
             </p:nvGraphicFramePr>
             <p:xfrm>
-              <a:off x="1239488" y="1693450"/>
-              <a:ext cx="6665025" cy="3200200"/>
+              <a:off x="828669" y="1554302"/>
+              <a:ext cx="7500322" cy="3367840"/>
             </p:xfrm>
             <a:graphic>
               <a:graphicData uri="http://schemas.openxmlformats.org/drawingml/2006/table">
@@ -12842,14 +12929,14 @@
                         </a:ext>
                       </a:extLst>
                     </a:gridCol>
-                    <a:gridCol w="1401150">
+                    <a:gridCol w="1842710">
                       <a:extLst>
                         <a:ext uri="{9D8B030D-6E8A-4147-A177-3AD203B41FA5}">
                           <a16:colId xmlns:a16="http://schemas.microsoft.com/office/drawing/2014/main" val="20001"/>
                         </a:ext>
                       </a:extLst>
                     </a:gridCol>
-                    <a:gridCol w="1355550">
+                    <a:gridCol w="1749287">
                       <a:extLst>
                         <a:ext uri="{9D8B030D-6E8A-4147-A177-3AD203B41FA5}">
                           <a16:colId xmlns:a16="http://schemas.microsoft.com/office/drawing/2014/main" val="20002"/>
@@ -12872,7 +12959,7 @@
                             </a:spcAft>
                             <a:buNone/>
                           </a:pPr>
-                          <a:endParaRPr/>
+                          <a:endParaRPr dirty="0"/>
                         </a:p>
                       </a:txBody>
                       <a:tcPr marL="91425" marR="91425" marT="91425" marB="91425"/>
@@ -12882,7 +12969,7 @@
                         <a:bodyPr/>
                         <a:lstStyle/>
                         <a:p>
-                          <a:pPr marL="0" lvl="0" indent="0" algn="l" rtl="0">
+                          <a:pPr marL="0" lvl="0" indent="0" algn="ctr" rtl="0">
                             <a:spcBef>
                               <a:spcPts val="0"/>
                             </a:spcBef>
@@ -12905,7 +12992,7 @@
                         <a:bodyPr/>
                         <a:lstStyle/>
                         <a:p>
-                          <a:pPr marL="0" lvl="0" indent="0" algn="l" rtl="0">
+                          <a:pPr marL="0" lvl="0" indent="0" algn="ctr" rtl="0">
                             <a:spcBef>
                               <a:spcPts val="0"/>
                             </a:spcBef>
@@ -12915,10 +13002,10 @@
                             <a:buNone/>
                           </a:pPr>
                           <a:r>
-                            <a:rPr lang="en"/>
+                            <a:rPr lang="en" dirty="0"/>
                             <a:t>Validation accuracy</a:t>
                           </a:r>
-                          <a:endParaRPr/>
+                          <a:endParaRPr dirty="0"/>
                         </a:p>
                       </a:txBody>
                       <a:tcPr marL="91425" marR="91425" marT="91425" marB="91425"/>
@@ -12945,10 +13032,10 @@
                             <a:buNone/>
                           </a:pPr>
                           <a:r>
-                            <a:rPr lang="en"/>
+                            <a:rPr lang="en" dirty="0"/>
                             <a:t>SimpleNet</a:t>
                           </a:r>
-                          <a:endParaRPr/>
+                          <a:endParaRPr dirty="0"/>
                         </a:p>
                       </a:txBody>
                       <a:tcPr marL="91425" marR="91425" marT="91425" marB="91425"/>
@@ -12974,18 +13061,11 @@
                               </m:oMathParaPr>
                               <m:oMath xmlns:m="http://schemas.openxmlformats.org/officeDocument/2006/math">
                                 <m:r>
-                                  <a:rPr lang="en" i="1" dirty="0" smtClean="0">
-                                    <a:latin typeface="Cambria Math" panose="02040503050406030204" pitchFamily="18" charset="0"/>
-                                    <a:ea typeface="Cambria" panose="02040503050406030204" pitchFamily="18" charset="0"/>
-                                  </a:rPr>
-                                  <m:t>7</m:t>
-                                </m:r>
-                                <m:r>
                                   <a:rPr lang="en-US" b="0" i="1" dirty="0" smtClean="0">
                                     <a:latin typeface="Cambria Math" panose="02040503050406030204" pitchFamily="18" charset="0"/>
                                     <a:ea typeface="Cambria" panose="02040503050406030204" pitchFamily="18" charset="0"/>
                                   </a:rPr>
-                                  <m:t>5.9</m:t>
+                                  <m:t>62.6</m:t>
                                 </m:r>
                                 <m:r>
                                   <a:rPr lang="en" i="1" dirty="0" smtClean="0">
@@ -13023,25 +13103,18 @@
                               </m:oMathParaPr>
                               <m:oMath xmlns:m="http://schemas.openxmlformats.org/officeDocument/2006/math">
                                 <m:r>
-                                  <a:rPr lang="en" i="1" dirty="0" smtClean="0">
-                                    <a:latin typeface="Cambria Math" panose="02040503050406030204" pitchFamily="18" charset="0"/>
-                                    <a:ea typeface="Cambria" panose="02040503050406030204" pitchFamily="18" charset="0"/>
-                                  </a:rPr>
-                                  <m:t>5</m:t>
-                                </m:r>
-                                <m:r>
                                   <a:rPr lang="en-US" b="0" i="1" dirty="0" smtClean="0">
                                     <a:latin typeface="Cambria Math" panose="02040503050406030204" pitchFamily="18" charset="0"/>
                                     <a:ea typeface="Cambria" panose="02040503050406030204" pitchFamily="18" charset="0"/>
                                   </a:rPr>
-                                  <m:t>4</m:t>
+                                  <m:t>48.4</m:t>
                                 </m:r>
                                 <m:r>
                                   <a:rPr lang="en" i="1" dirty="0" smtClean="0">
                                     <a:latin typeface="Cambria Math" panose="02040503050406030204" pitchFamily="18" charset="0"/>
                                     <a:ea typeface="Cambria" panose="02040503050406030204" pitchFamily="18" charset="0"/>
                                   </a:rPr>
-                                  <m:t>.8%</m:t>
+                                  <m:t>%</m:t>
                                 </m:r>
                               </m:oMath>
                             </m:oMathPara>
@@ -13106,7 +13179,145 @@
                                   <a:rPr lang="en-US" b="0" i="1" smtClean="0">
                                     <a:latin typeface="Cambria Math" panose="02040503050406030204" pitchFamily="18" charset="0"/>
                                   </a:rPr>
-                                  <m:t>69.4%</m:t>
+                                  <m:t>55</m:t>
+                                </m:r>
+                                <m:r>
+                                  <a:rPr lang="en-US" b="0" i="1" smtClean="0">
+                                    <a:latin typeface="Cambria Math" panose="02040503050406030204" pitchFamily="18" charset="0"/>
+                                  </a:rPr>
+                                  <m:t>%</m:t>
+                                </m:r>
+                              </m:oMath>
+                            </m:oMathPara>
+                          </a14:m>
+                          <a:endParaRPr dirty="0"/>
+                        </a:p>
+                      </a:txBody>
+                      <a:tcPr marL="91425" marR="91425" marT="91425" marB="91425"/>
+                    </a:tc>
+                    <a:tc>
+                      <a:txBody>
+                        <a:bodyPr/>
+                        <a:lstStyle/>
+                        <a:p>
+                          <a:pPr marL="0" lvl="0" indent="0" algn="ctr" rtl="0">
+                            <a:spcBef>
+                              <a:spcPts val="0"/>
+                            </a:spcBef>
+                            <a:spcAft>
+                              <a:spcPts val="0"/>
+                            </a:spcAft>
+                            <a:buNone/>
+                          </a:pPr>
+                          <a14:m>
+                            <m:oMath xmlns:m="http://schemas.openxmlformats.org/officeDocument/2006/math">
+                              <m:r>
+                                <a:rPr lang="en-US" sz="1400" b="0" i="1" smtClean="0">
+                                  <a:latin typeface="Cambria Math" panose="02040503050406030204" pitchFamily="18" charset="0"/>
+                                </a:rPr>
+                                <m:t>29.4</m:t>
+                              </m:r>
+                              <m:r>
+                                <a:rPr lang="en-US" sz="1400" b="0" i="1" smtClean="0">
+                                  <a:latin typeface="Cambria Math" panose="02040503050406030204" pitchFamily="18" charset="0"/>
+                                </a:rPr>
+                                <m:t>%</m:t>
+                              </m:r>
+                            </m:oMath>
+                          </a14:m>
+                          <a:r>
+                            <a:rPr lang="en-US" sz="1400" dirty="0"/>
+                            <a:t> </a:t>
+                          </a:r>
+                          <a:r>
+                            <a:rPr lang="en-US" sz="1100" dirty="0">
+                              <a:latin typeface="Cambria" panose="02040503050406030204" pitchFamily="18" charset="0"/>
+                              <a:ea typeface="Cambria" panose="02040503050406030204" pitchFamily="18" charset="0"/>
+                            </a:rPr>
+                            <a:t>(Consistently lower than row 1)</a:t>
+                          </a:r>
+                          <a:endParaRPr sz="1400" dirty="0">
+                            <a:latin typeface="Cambria" panose="02040503050406030204" pitchFamily="18" charset="0"/>
+                            <a:ea typeface="Cambria" panose="02040503050406030204" pitchFamily="18" charset="0"/>
+                          </a:endParaRPr>
+                        </a:p>
+                      </a:txBody>
+                      <a:tcPr marL="91425" marR="91425" marT="91425" marB="91425"/>
+                    </a:tc>
+                    <a:extLst>
+                      <a:ext uri="{0D108BD9-81ED-4DB2-BD59-A6C34878D82A}">
+                        <a16:rowId xmlns:a16="http://schemas.microsoft.com/office/drawing/2014/main" val="10002"/>
+                      </a:ext>
+                    </a:extLst>
+                  </a:tr>
+                  <a:tr h="609575">
+                    <a:tc>
+                      <a:txBody>
+                        <a:bodyPr/>
+                        <a:lstStyle/>
+                        <a:p>
+                          <a:pPr marL="457200" lvl="0" indent="-317500" algn="l" rtl="0">
+                            <a:spcBef>
+                              <a:spcPts val="0"/>
+                            </a:spcBef>
+                            <a:spcAft>
+                              <a:spcPts val="0"/>
+                            </a:spcAft>
+                            <a:buSzPts val="1400"/>
+                            <a:buChar char="+"/>
+                          </a:pPr>
+                          <a:r>
+                            <a:rPr lang="en" dirty="0"/>
+                            <a:t>Zero-centering &amp; variance-normalization</a:t>
+                          </a:r>
+                          <a:endParaRPr dirty="0"/>
+                        </a:p>
+                      </a:txBody>
+                      <a:tcPr marL="91425" marR="91425" marT="91425" marB="91425"/>
+                    </a:tc>
+                    <a:tc>
+                      <a:txBody>
+                        <a:bodyPr/>
+                        <a:lstStyle/>
+                        <a:p>
+                          <a:pPr marL="0" lvl="0" indent="0" algn="ctr" rtl="0">
+                            <a:spcBef>
+                              <a:spcPts val="0"/>
+                            </a:spcBef>
+                            <a:spcAft>
+                              <a:spcPts val="0"/>
+                            </a:spcAft>
+                            <a:buNone/>
+                          </a:pPr>
+                          <a14:m>
+                            <m:oMathPara xmlns:m="http://schemas.openxmlformats.org/officeDocument/2006/math">
+                              <m:oMathParaPr>
+                                <m:jc m:val="centerGroup"/>
+                              </m:oMathParaPr>
+                              <m:oMath xmlns:m="http://schemas.openxmlformats.org/officeDocument/2006/math">
+                                <m:r>
+                                  <a:rPr lang="en-US" b="0" i="1" smtClean="0">
+                                    <a:latin typeface="Cambria Math" panose="02040503050406030204" pitchFamily="18" charset="0"/>
+                                  </a:rPr>
+                                  <m:t>76</m:t>
+                                </m:r>
+                                <m:r>
+                                  <a:rPr lang="en-US" b="0" i="1" smtClean="0">
+                                    <a:latin typeface="Cambria Math" panose="02040503050406030204" pitchFamily="18" charset="0"/>
+                                  </a:rPr>
+                                  <m:t>.</m:t>
+                                </m:r>
+                                <m:r>
+                                  <a:rPr lang="en-US" b="0" i="1" smtClean="0">
+                                    <a:latin typeface="Cambria Math" panose="02040503050406030204" pitchFamily="18" charset="0"/>
+                                  </a:rPr>
+                                  <m:t>4</m:t>
+                                </m:r>
+                                <m:r>
+                                  <a:rPr lang="en-US" b="0" i="1" smtClean="0">
+                                    <a:latin typeface="Cambria Math" panose="02040503050406030204" pitchFamily="18" charset="0"/>
+                                  </a:rPr>
+                                  <m:t>%</m:t>
                                 </m:r>
                               </m:oMath>
                             </m:oMathPara>
@@ -13140,7 +13351,13 @@
                                   <a:rPr lang="en-US" b="0" i="1" smtClean="0">
                                     <a:latin typeface="Cambria Math" panose="02040503050406030204" pitchFamily="18" charset="0"/>
                                   </a:rPr>
-                                  <m:t>52.8%</m:t>
+                                  <m:t>58</m:t>
+                                </m:r>
+                                <m:r>
+                                  <a:rPr lang="en-US" b="0" i="1" smtClean="0">
+                                    <a:latin typeface="Cambria Math" panose="02040503050406030204" pitchFamily="18" charset="0"/>
+                                  </a:rPr>
+                                  <m:t>%</m:t>
                                 </m:r>
                               </m:oMath>
                             </m:oMathPara>
@@ -13152,11 +13369,11 @@
                     </a:tc>
                     <a:extLst>
                       <a:ext uri="{0D108BD9-81ED-4DB2-BD59-A6C34878D82A}">
-                        <a16:rowId xmlns:a16="http://schemas.microsoft.com/office/drawing/2014/main" val="10002"/>
+                        <a16:rowId xmlns:a16="http://schemas.microsoft.com/office/drawing/2014/main" val="10003"/>
                       </a:ext>
                     </a:extLst>
                   </a:tr>
-                  <a:tr h="609575">
+                  <a:tr h="396200">
                     <a:tc>
                       <a:txBody>
                         <a:bodyPr/>
@@ -13173,10 +13390,10 @@
                             <a:buChar char="+"/>
                           </a:pPr>
                           <a:r>
-                            <a:rPr lang="en"/>
-                            <a:t>Zero-centering &amp; variance-normalization</a:t>
+                            <a:rPr lang="en" dirty="0"/>
+                            <a:t>Dropout regularization</a:t>
                           </a:r>
-                          <a:endParaRPr/>
+                          <a:endParaRPr dirty="0"/>
                         </a:p>
                       </a:txBody>
                       <a:tcPr marL="91425" marR="91425" marT="91425" marB="91425"/>
@@ -13205,7 +13422,13 @@
                                   <a:rPr lang="en-US" b="0" i="1" smtClean="0">
                                     <a:latin typeface="Cambria Math" panose="02040503050406030204" pitchFamily="18" charset="0"/>
                                   </a:rPr>
-                                  <m:t>75.9%</m:t>
+                                  <m:t>64.7</m:t>
+                                </m:r>
+                                <m:r>
+                                  <a:rPr lang="en-US" b="0" i="1" smtClean="0">
+                                    <a:latin typeface="Cambria Math" panose="02040503050406030204" pitchFamily="18" charset="0"/>
+                                  </a:rPr>
+                                  <m:t>%</m:t>
                                 </m:r>
                               </m:oMath>
                             </m:oMathPara>
@@ -13239,106 +13462,13 @@
                                   <a:rPr lang="en-US" b="0" i="1" smtClean="0">
                                     <a:latin typeface="Cambria Math" panose="02040503050406030204" pitchFamily="18" charset="0"/>
                                   </a:rPr>
-                                  <m:t>59.1%</m:t>
+                                  <m:t>57.7</m:t>
                                 </m:r>
-                              </m:oMath>
-                            </m:oMathPara>
-                          </a14:m>
-                          <a:endParaRPr dirty="0"/>
-                        </a:p>
-                      </a:txBody>
-                      <a:tcPr marL="91425" marR="91425" marT="91425" marB="91425"/>
-                    </a:tc>
-                    <a:extLst>
-                      <a:ext uri="{0D108BD9-81ED-4DB2-BD59-A6C34878D82A}">
-                        <a16:rowId xmlns:a16="http://schemas.microsoft.com/office/drawing/2014/main" val="10003"/>
-                      </a:ext>
-                    </a:extLst>
-                  </a:tr>
-                  <a:tr h="396200">
-                    <a:tc>
-                      <a:txBody>
-                        <a:bodyPr/>
-                        <a:lstStyle/>
-                        <a:p>
-                          <a:pPr marL="457200" lvl="0" indent="-317500" algn="l" rtl="0">
-                            <a:spcBef>
-                              <a:spcPts val="0"/>
-                            </a:spcBef>
-                            <a:spcAft>
-                              <a:spcPts val="0"/>
-                            </a:spcAft>
-                            <a:buSzPts val="1400"/>
-                            <a:buChar char="+"/>
-                          </a:pPr>
-                          <a:r>
-                            <a:rPr lang="en"/>
-                            <a:t>Dropout regularization</a:t>
-                          </a:r>
-                          <a:endParaRPr/>
-                        </a:p>
-                      </a:txBody>
-                      <a:tcPr marL="91425" marR="91425" marT="91425" marB="91425"/>
-                    </a:tc>
-                    <a:tc>
-                      <a:txBody>
-                        <a:bodyPr/>
-                        <a:lstStyle/>
-                        <a:p>
-                          <a:pPr marL="0" lvl="0" indent="0" algn="ctr" rtl="0">
-                            <a:spcBef>
-                              <a:spcPts val="0"/>
-                            </a:spcBef>
-                            <a:spcAft>
-                              <a:spcPts val="0"/>
-                            </a:spcAft>
-                            <a:buNone/>
-                          </a:pPr>
-                          <a14:m>
-                            <m:oMathPara xmlns:m="http://schemas.openxmlformats.org/officeDocument/2006/math">
-                              <m:oMathParaPr>
-                                <m:jc m:val="centerGroup"/>
-                              </m:oMathParaPr>
-                              <m:oMath xmlns:m="http://schemas.openxmlformats.org/officeDocument/2006/math">
                                 <m:r>
                                   <a:rPr lang="en-US" b="0" i="1" smtClean="0">
                                     <a:latin typeface="Cambria Math" panose="02040503050406030204" pitchFamily="18" charset="0"/>
                                   </a:rPr>
-                                  <m:t>77.1%</m:t>
-                                </m:r>
-                              </m:oMath>
-                            </m:oMathPara>
-                          </a14:m>
-                          <a:endParaRPr dirty="0"/>
-                        </a:p>
-                      </a:txBody>
-                      <a:tcPr marL="91425" marR="91425" marT="91425" marB="91425"/>
-                    </a:tc>
-                    <a:tc>
-                      <a:txBody>
-                        <a:bodyPr/>
-                        <a:lstStyle/>
-                        <a:p>
-                          <a:pPr marL="0" lvl="0" indent="0" algn="ctr" rtl="0">
-                            <a:spcBef>
-                              <a:spcPts val="0"/>
-                            </a:spcBef>
-                            <a:spcAft>
-                              <a:spcPts val="0"/>
-                            </a:spcAft>
-                            <a:buNone/>
-                          </a:pPr>
-                          <a14:m>
-                            <m:oMathPara xmlns:m="http://schemas.openxmlformats.org/officeDocument/2006/math">
-                              <m:oMathParaPr>
-                                <m:jc m:val="centerGroup"/>
-                              </m:oMathParaPr>
-                              <m:oMath xmlns:m="http://schemas.openxmlformats.org/officeDocument/2006/math">
-                                <m:r>
-                                  <a:rPr lang="en-US" b="0" i="1" smtClean="0">
-                                    <a:latin typeface="Cambria Math" panose="02040503050406030204" pitchFamily="18" charset="0"/>
-                                  </a:rPr>
-                                  <m:t>62.2%</m:t>
+                                  <m:t>%</m:t>
                                 </m:r>
                               </m:oMath>
                             </m:oMathPara>
@@ -13403,7 +13533,25 @@
                                   <a:rPr lang="en-US" b="0" i="1" smtClean="0">
                                     <a:latin typeface="Cambria Math" panose="02040503050406030204" pitchFamily="18" charset="0"/>
                                   </a:rPr>
-                                  <m:t>64.3%</m:t>
+                                  <m:t>68</m:t>
+                                </m:r>
+                                <m:r>
+                                  <a:rPr lang="en-US" b="0" i="1" smtClean="0">
+                                    <a:latin typeface="Cambria Math" panose="02040503050406030204" pitchFamily="18" charset="0"/>
+                                  </a:rPr>
+                                  <m:t>.</m:t>
+                                </m:r>
+                                <m:r>
+                                  <a:rPr lang="en-US" b="0" i="1" smtClean="0">
+                                    <a:latin typeface="Cambria Math" panose="02040503050406030204" pitchFamily="18" charset="0"/>
+                                  </a:rPr>
+                                  <m:t>8</m:t>
+                                </m:r>
+                                <m:r>
+                                  <a:rPr lang="en-US" b="0" i="1" smtClean="0">
+                                    <a:latin typeface="Cambria Math" panose="02040503050406030204" pitchFamily="18" charset="0"/>
+                                  </a:rPr>
+                                  <m:t>%</m:t>
                                 </m:r>
                               </m:oMath>
                             </m:oMathPara>
@@ -13437,7 +13585,25 @@
                                   <a:rPr lang="en-US" b="0" i="1" smtClean="0">
                                     <a:latin typeface="Cambria Math" panose="02040503050406030204" pitchFamily="18" charset="0"/>
                                   </a:rPr>
-                                  <m:t>58.3%</m:t>
+                                  <m:t>57</m:t>
+                                </m:r>
+                                <m:r>
+                                  <a:rPr lang="en-US" b="0" i="1" smtClean="0">
+                                    <a:latin typeface="Cambria Math" panose="02040503050406030204" pitchFamily="18" charset="0"/>
+                                  </a:rPr>
+                                  <m:t>.</m:t>
+                                </m:r>
+                                <m:r>
+                                  <a:rPr lang="en-US" b="0" i="1" smtClean="0">
+                                    <a:latin typeface="Cambria Math" panose="02040503050406030204" pitchFamily="18" charset="0"/>
+                                  </a:rPr>
+                                  <m:t>9</m:t>
+                                </m:r>
+                                <m:r>
+                                  <a:rPr lang="en-US" b="0" i="1" smtClean="0">
+                                    <a:latin typeface="Cambria Math" panose="02040503050406030204" pitchFamily="18" charset="0"/>
+                                  </a:rPr>
+                                  <m:t>%</m:t>
                                 </m:r>
                               </m:oMath>
                             </m:oMathPara>
@@ -13502,7 +13668,13 @@
                                   <a:rPr lang="en-US" b="0" i="1" smtClean="0">
                                     <a:latin typeface="Cambria Math" panose="02040503050406030204" pitchFamily="18" charset="0"/>
                                   </a:rPr>
-                                  <m:t>66.2%</m:t>
+                                  <m:t>74.8</m:t>
+                                </m:r>
+                                <m:r>
+                                  <a:rPr lang="en-US" b="0" i="1" smtClean="0">
+                                    <a:latin typeface="Cambria Math" panose="02040503050406030204" pitchFamily="18" charset="0"/>
+                                  </a:rPr>
+                                  <m:t>%</m:t>
                                 </m:r>
                               </m:oMath>
                             </m:oMathPara>
@@ -13536,7 +13708,13 @@
                                   <a:rPr lang="en-US" b="0" i="1" smtClean="0">
                                     <a:latin typeface="Cambria Math" panose="02040503050406030204" pitchFamily="18" charset="0"/>
                                   </a:rPr>
-                                  <m:t>56.0%</m:t>
+                                  <m:t>63.5</m:t>
+                                </m:r>
+                                <m:r>
+                                  <a:rPr lang="en-US" b="0" i="1" smtClean="0">
+                                    <a:latin typeface="Cambria Math" panose="02040503050406030204" pitchFamily="18" charset="0"/>
+                                  </a:rPr>
+                                  <m:t>%</m:t>
                                 </m:r>
                               </m:oMath>
                             </m:oMathPara>
@@ -13565,14 +13743,14 @@
               <p:nvPr>
                 <p:extLst>
                   <p:ext uri="{D42A27DB-BD31-4B8C-83A1-F6EECF244321}">
-                    <p14:modId xmlns:p14="http://schemas.microsoft.com/office/powerpoint/2010/main" val="1709444507"/>
+                    <p14:modId xmlns:p14="http://schemas.microsoft.com/office/powerpoint/2010/main" val="3667458864"/>
                   </p:ext>
                 </p:extLst>
               </p:nvPr>
             </p:nvGraphicFramePr>
             <p:xfrm>
-              <a:off x="1239488" y="1693450"/>
-              <a:ext cx="6665025" cy="3200200"/>
+              <a:off x="828669" y="1554302"/>
+              <a:ext cx="7500322" cy="3367840"/>
             </p:xfrm>
             <a:graphic>
               <a:graphicData uri="http://schemas.openxmlformats.org/drawingml/2006/table">
@@ -13589,14 +13767,14 @@
                         </a:ext>
                       </a:extLst>
                     </a:gridCol>
-                    <a:gridCol w="1401150">
+                    <a:gridCol w="1842710">
                       <a:extLst>
                         <a:ext uri="{9D8B030D-6E8A-4147-A177-3AD203B41FA5}">
                           <a16:colId xmlns:a16="http://schemas.microsoft.com/office/drawing/2014/main" val="20001"/>
                         </a:ext>
                       </a:extLst>
                     </a:gridCol>
-                    <a:gridCol w="1355550">
+                    <a:gridCol w="1749287">
                       <a:extLst>
                         <a:ext uri="{9D8B030D-6E8A-4147-A177-3AD203B41FA5}">
                           <a16:colId xmlns:a16="http://schemas.microsoft.com/office/drawing/2014/main" val="20002"/>
@@ -13619,7 +13797,7 @@
                             </a:spcAft>
                             <a:buNone/>
                           </a:pPr>
-                          <a:endParaRPr/>
+                          <a:endParaRPr dirty="0"/>
                         </a:p>
                       </a:txBody>
                       <a:tcPr marL="91425" marR="91425" marT="91425" marB="91425"/>
@@ -13629,7 +13807,7 @@
                         <a:bodyPr/>
                         <a:lstStyle/>
                         <a:p>
-                          <a:pPr marL="0" lvl="0" indent="0" algn="l" rtl="0">
+                          <a:pPr marL="0" lvl="0" indent="0" algn="ctr" rtl="0">
                             <a:spcBef>
                               <a:spcPts val="0"/>
                             </a:spcBef>
@@ -13652,7 +13830,7 @@
                         <a:bodyPr/>
                         <a:lstStyle/>
                         <a:p>
-                          <a:pPr marL="0" lvl="0" indent="0" algn="l" rtl="0">
+                          <a:pPr marL="0" lvl="0" indent="0" algn="ctr" rtl="0">
                             <a:spcBef>
                               <a:spcPts val="0"/>
                             </a:spcBef>
@@ -13662,10 +13840,10 @@
                             <a:buNone/>
                           </a:pPr>
                           <a:r>
-                            <a:rPr lang="en"/>
+                            <a:rPr lang="en" dirty="0"/>
                             <a:t>Validation accuracy</a:t>
                           </a:r>
-                          <a:endParaRPr/>
+                          <a:endParaRPr dirty="0"/>
                         </a:p>
                       </a:txBody>
                       <a:tcPr marL="91425" marR="91425" marT="91425" marB="91425"/>
@@ -13692,10 +13870,10 @@
                             <a:buNone/>
                           </a:pPr>
                           <a:r>
-                            <a:rPr lang="en"/>
+                            <a:rPr lang="en" dirty="0"/>
                             <a:t>SimpleNet</a:t>
                           </a:r>
-                          <a:endParaRPr/>
+                          <a:endParaRPr dirty="0"/>
                         </a:p>
                       </a:txBody>
                       <a:tcPr marL="91425" marR="91425" marT="91425" marB="91425"/>
@@ -13712,7 +13890,7 @@
                         <a:blipFill>
                           <a:blip r:embed="rId3"/>
                           <a:stretch>
-                            <a:fillRect l="-280786" t="-153846" r="-98253" b="-560000"/>
+                            <a:fillRect l="-211881" t="-153846" r="-95050" b="-601538"/>
                           </a:stretch>
                         </a:blipFill>
                       </a:tcPr>
@@ -13729,7 +13907,7 @@
                         <a:blipFill>
                           <a:blip r:embed="rId3"/>
                           <a:stretch>
-                            <a:fillRect l="-391031" t="-153846" r="-897" b="-560000"/>
+                            <a:fillRect l="-329268" t="-153846" r="-348" b="-601538"/>
                           </a:stretch>
                         </a:blipFill>
                       </a:tcPr>
@@ -13740,7 +13918,7 @@
                       </a:ext>
                     </a:extLst>
                   </a:tr>
-                  <a:tr h="396210">
+                  <a:tr h="563850">
                     <a:tc>
                       <a:txBody>
                         <a:bodyPr/>
@@ -13777,7 +13955,7 @@
                         <a:blipFill>
                           <a:blip r:embed="rId3"/>
                           <a:stretch>
-                            <a:fillRect l="-280786" t="-253846" r="-98253" b="-460000"/>
+                            <a:fillRect l="-211881" t="-177419" r="-95050" b="-320430"/>
                           </a:stretch>
                         </a:blipFill>
                       </a:tcPr>
@@ -13794,7 +13972,7 @@
                         <a:blipFill>
                           <a:blip r:embed="rId3"/>
                           <a:stretch>
-                            <a:fillRect l="-391031" t="-253846" r="-897" b="-460000"/>
+                            <a:fillRect l="-329268" t="-177419" r="-348" b="-320430"/>
                           </a:stretch>
                         </a:blipFill>
                       </a:tcPr>
@@ -13822,10 +14000,10 @@
                             <a:buChar char="+"/>
                           </a:pPr>
                           <a:r>
-                            <a:rPr lang="en"/>
+                            <a:rPr lang="en" dirty="0"/>
                             <a:t>Zero-centering &amp; variance-normalization</a:t>
                           </a:r>
-                          <a:endParaRPr/>
+                          <a:endParaRPr dirty="0"/>
                         </a:p>
                       </a:txBody>
                       <a:tcPr marL="91425" marR="91425" marT="91425" marB="91425"/>
@@ -13842,7 +14020,7 @@
                         <a:blipFill>
                           <a:blip r:embed="rId3"/>
                           <a:stretch>
-                            <a:fillRect l="-280786" t="-227723" r="-98253" b="-196040"/>
+                            <a:fillRect l="-211881" t="-258000" r="-95050" b="-198000"/>
                           </a:stretch>
                         </a:blipFill>
                       </a:tcPr>
@@ -13859,7 +14037,7 @@
                         <a:blipFill>
                           <a:blip r:embed="rId3"/>
                           <a:stretch>
-                            <a:fillRect l="-391031" t="-227723" r="-897" b="-196040"/>
+                            <a:fillRect l="-329268" t="-258000" r="-348" b="-198000"/>
                           </a:stretch>
                         </a:blipFill>
                       </a:tcPr>
@@ -13887,10 +14065,10 @@
                             <a:buChar char="+"/>
                           </a:pPr>
                           <a:r>
-                            <a:rPr lang="en"/>
+                            <a:rPr lang="en" dirty="0"/>
                             <a:t>Dropout regularization</a:t>
                           </a:r>
-                          <a:endParaRPr/>
+                          <a:endParaRPr dirty="0"/>
                         </a:p>
                       </a:txBody>
                       <a:tcPr marL="91425" marR="91425" marT="91425" marB="91425"/>
@@ -13907,7 +14085,7 @@
                         <a:blipFill>
                           <a:blip r:embed="rId3"/>
                           <a:stretch>
-                            <a:fillRect l="-280786" t="-509231" r="-98253" b="-204615"/>
+                            <a:fillRect l="-211881" t="-542424" r="-95050" b="-200000"/>
                           </a:stretch>
                         </a:blipFill>
                       </a:tcPr>
@@ -13924,7 +14102,7 @@
                         <a:blipFill>
                           <a:blip r:embed="rId3"/>
                           <a:stretch>
-                            <a:fillRect l="-391031" t="-509231" r="-897" b="-204615"/>
+                            <a:fillRect l="-329268" t="-542424" r="-348" b="-200000"/>
                           </a:stretch>
                         </a:blipFill>
                       </a:tcPr>
@@ -13972,7 +14150,7 @@
                         <a:blipFill>
                           <a:blip r:embed="rId3"/>
                           <a:stretch>
-                            <a:fillRect l="-280786" t="-609231" r="-98253" b="-104615"/>
+                            <a:fillRect l="-211881" t="-652308" r="-95050" b="-103077"/>
                           </a:stretch>
                         </a:blipFill>
                       </a:tcPr>
@@ -13989,7 +14167,7 @@
                         <a:blipFill>
                           <a:blip r:embed="rId3"/>
                           <a:stretch>
-                            <a:fillRect l="-391031" t="-609231" r="-897" b="-104615"/>
+                            <a:fillRect l="-329268" t="-652308" r="-348" b="-103077"/>
                           </a:stretch>
                         </a:blipFill>
                       </a:tcPr>
@@ -14037,7 +14215,7 @@
                         <a:blipFill>
                           <a:blip r:embed="rId3"/>
                           <a:stretch>
-                            <a:fillRect l="-280786" t="-709231" r="-98253" b="-4615"/>
+                            <a:fillRect l="-211881" t="-752308" r="-95050" b="-3077"/>
                           </a:stretch>
                         </a:blipFill>
                       </a:tcPr>
@@ -14054,7 +14232,7 @@
                         <a:blipFill>
                           <a:blip r:embed="rId3"/>
                           <a:stretch>
-                            <a:fillRect l="-391031" t="-709231" r="-897" b="-4615"/>
+                            <a:fillRect l="-329268" t="-752308" r="-348" b="-3077"/>
                           </a:stretch>
                         </a:blipFill>
                       </a:tcPr>
@@ -14304,28 +14482,10 @@
                 <a14:m>
                   <m:oMath xmlns:m="http://schemas.openxmlformats.org/officeDocument/2006/math">
                     <m:r>
-                      <a:rPr lang="en-US" i="1" dirty="0" smtClean="0">
-                        <a:latin typeface="Cambria Math" panose="02040503050406030204" pitchFamily="18" charset="0"/>
-                      </a:rPr>
-                      <m:t>6</m:t>
-                    </m:r>
-                    <m:r>
                       <a:rPr lang="en-US" b="0" i="1" dirty="0" smtClean="0">
                         <a:latin typeface="Cambria Math" panose="02040503050406030204" pitchFamily="18" charset="0"/>
                       </a:rPr>
-                      <m:t>6</m:t>
-                    </m:r>
-                    <m:r>
-                      <a:rPr lang="en-US" i="1" dirty="0" smtClean="0">
-                        <a:latin typeface="Cambria Math" panose="02040503050406030204" pitchFamily="18" charset="0"/>
-                      </a:rPr>
-                      <m:t>.</m:t>
-                    </m:r>
-                    <m:r>
-                      <a:rPr lang="en-US" b="0" i="1" dirty="0" smtClean="0">
-                        <a:latin typeface="Cambria Math" panose="02040503050406030204" pitchFamily="18" charset="0"/>
-                      </a:rPr>
-                      <m:t>2</m:t>
+                      <m:t>74.8</m:t>
                     </m:r>
                     <m:r>
                       <a:rPr lang="en-US" i="1" dirty="0" smtClean="0">
@@ -14357,7 +14517,13 @@
                       <a:rPr lang="en-US" b="0" i="1" smtClean="0">
                         <a:latin typeface="Cambria Math" panose="02040503050406030204" pitchFamily="18" charset="0"/>
                       </a:rPr>
-                      <m:t>56.0%</m:t>
+                      <m:t>63.5</m:t>
+                    </m:r>
+                    <m:r>
+                      <a:rPr lang="en-US" b="0" i="1" smtClean="0">
+                        <a:latin typeface="Cambria Math" panose="02040503050406030204" pitchFamily="18" charset="0"/>
+                      </a:rPr>
+                      <m:t>%</m:t>
                     </m:r>
                   </m:oMath>
                 </a14:m>
@@ -14442,19 +14608,19 @@
               <a:buNone/>
             </a:pPr>
             <a:r>
-              <a:rPr lang="en"/>
+              <a:rPr lang="en" dirty="0"/>
               <a:t>[Insert accuracy plot for SimpleNetFinal here]</a:t>
             </a:r>
-            <a:endParaRPr/>
+            <a:endParaRPr dirty="0"/>
           </a:p>
         </p:txBody>
       </p:sp>
       <p:pic>
         <p:nvPicPr>
-          <p:cNvPr id="4" name="Picture 3">
+          <p:cNvPr id="3" name="Picture 2">
             <a:extLst>
               <a:ext uri="{FF2B5EF4-FFF2-40B4-BE49-F238E27FC236}">
-                <a16:creationId xmlns:a16="http://schemas.microsoft.com/office/drawing/2014/main" id="{0168A3C1-98A1-B89D-F6D3-28671E9A70F8}"/>
+                <a16:creationId xmlns:a16="http://schemas.microsoft.com/office/drawing/2014/main" id="{ED1850BC-C9B2-2AD7-1770-95F2EFCC2DE5}"/>
               </a:ext>
             </a:extLst>
           </p:cNvPr>
@@ -14471,8 +14637,8 @@
         </p:blipFill>
         <p:spPr>
           <a:xfrm>
-            <a:off x="480515" y="1536876"/>
-            <a:ext cx="2652829" cy="2119456"/>
+            <a:off x="311700" y="1536875"/>
+            <a:ext cx="2696543" cy="2120719"/>
           </a:xfrm>
           <a:prstGeom prst="rect">
             <a:avLst/>
@@ -14481,10 +14647,10 @@
       </p:pic>
       <p:pic>
         <p:nvPicPr>
-          <p:cNvPr id="7" name="Picture 6">
+          <p:cNvPr id="6" name="Picture 5">
             <a:extLst>
               <a:ext uri="{FF2B5EF4-FFF2-40B4-BE49-F238E27FC236}">
-                <a16:creationId xmlns:a16="http://schemas.microsoft.com/office/drawing/2014/main" id="{E62E9CCA-54C3-0BA2-DF0C-FDAEF546108E}"/>
+                <a16:creationId xmlns:a16="http://schemas.microsoft.com/office/drawing/2014/main" id="{B5C121B7-2CEB-A3AD-32F4-3B4A35973E1C}"/>
               </a:ext>
             </a:extLst>
           </p:cNvPr>
@@ -14501,8 +14667,8 @@
         </p:blipFill>
         <p:spPr>
           <a:xfrm>
-            <a:off x="5303518" y="1536875"/>
-            <a:ext cx="2652831" cy="2119458"/>
+            <a:off x="5274365" y="1536875"/>
+            <a:ext cx="2650435" cy="2117543"/>
           </a:xfrm>
           <a:prstGeom prst="rect">
             <a:avLst/>
@@ -15473,7 +15639,19 @@
                       <a:rPr lang="en-US" b="0" i="1" smtClean="0">
                         <a:latin typeface="Cambria Math" panose="02040503050406030204" pitchFamily="18" charset="0"/>
                       </a:rPr>
-                      <m:t>89.7%</m:t>
+                      <m:t>8</m:t>
+                    </m:r>
+                    <m:r>
+                      <a:rPr lang="en-US" b="0" i="1" smtClean="0">
+                        <a:latin typeface="Cambria Math" panose="02040503050406030204" pitchFamily="18" charset="0"/>
+                      </a:rPr>
+                      <m:t>8</m:t>
+                    </m:r>
+                    <m:r>
+                      <a:rPr lang="en-US" b="0" i="1" smtClean="0">
+                        <a:latin typeface="Cambria Math" panose="02040503050406030204" pitchFamily="18" charset="0"/>
+                      </a:rPr>
+                      <m:t>.7%</m:t>
                     </m:r>
                   </m:oMath>
                 </a14:m>
@@ -15499,7 +15677,19 @@
                       <a:rPr lang="en-US" b="0" i="1" smtClean="0">
                         <a:latin typeface="Cambria Math" panose="02040503050406030204" pitchFamily="18" charset="0"/>
                       </a:rPr>
-                      <m:t>88.3%</m:t>
+                      <m:t>88.</m:t>
+                    </m:r>
+                    <m:r>
+                      <a:rPr lang="en-US" b="0" i="1" smtClean="0">
+                        <a:latin typeface="Cambria Math" panose="02040503050406030204" pitchFamily="18" charset="0"/>
+                      </a:rPr>
+                      <m:t>2</m:t>
+                    </m:r>
+                    <m:r>
+                      <a:rPr lang="en-US" b="0" i="1" smtClean="0">
+                        <a:latin typeface="Cambria Math" panose="02040503050406030204" pitchFamily="18" charset="0"/>
+                      </a:rPr>
+                      <m:t>%</m:t>
                     </m:r>
                   </m:oMath>
                 </a14:m>
@@ -15593,10 +15783,10 @@
       </p:sp>
       <p:pic>
         <p:nvPicPr>
-          <p:cNvPr id="4" name="Picture 3">
+          <p:cNvPr id="3" name="Picture 2">
             <a:extLst>
               <a:ext uri="{FF2B5EF4-FFF2-40B4-BE49-F238E27FC236}">
-                <a16:creationId xmlns:a16="http://schemas.microsoft.com/office/drawing/2014/main" id="{7EC55419-5E12-C52A-BA3F-4A6675F69360}"/>
+                <a16:creationId xmlns:a16="http://schemas.microsoft.com/office/drawing/2014/main" id="{1791E5E5-63CD-391C-397D-23556049A38C}"/>
               </a:ext>
             </a:extLst>
           </p:cNvPr>
@@ -15613,8 +15803,8 @@
         </p:blipFill>
         <p:spPr>
           <a:xfrm>
-            <a:off x="51300" y="1448507"/>
-            <a:ext cx="2700338" cy="2157413"/>
+            <a:off x="450238" y="1493043"/>
+            <a:ext cx="2728549" cy="2112877"/>
           </a:xfrm>
           <a:prstGeom prst="rect">
             <a:avLst/>
@@ -15623,10 +15813,10 @@
       </p:pic>
       <p:pic>
         <p:nvPicPr>
-          <p:cNvPr id="7" name="Picture 6">
+          <p:cNvPr id="6" name="Picture 5">
             <a:extLst>
               <a:ext uri="{FF2B5EF4-FFF2-40B4-BE49-F238E27FC236}">
-                <a16:creationId xmlns:a16="http://schemas.microsoft.com/office/drawing/2014/main" id="{8F509B9F-110B-0A25-3509-CEB469AC2E43}"/>
+                <a16:creationId xmlns:a16="http://schemas.microsoft.com/office/drawing/2014/main" id="{DAE2C52F-5B07-8C73-8F1D-C527988C2E30}"/>
               </a:ext>
             </a:extLst>
           </p:cNvPr>
@@ -15643,8 +15833,8 @@
         </p:blipFill>
         <p:spPr>
           <a:xfrm>
-            <a:off x="4548266" y="1493043"/>
-            <a:ext cx="2686572" cy="2112877"/>
+            <a:off x="4572000" y="1515311"/>
+            <a:ext cx="2686573" cy="2112877"/>
           </a:xfrm>
           <a:prstGeom prst="rect">
             <a:avLst/>
@@ -15897,7 +16087,7 @@
             </a:r>
           </a:p>
           <a:p>
-            <a:pPr marL="0" lvl="0" indent="0" algn="l" rtl="0">
+            <a:pPr marL="0" lvl="0" indent="0" algn="just" rtl="0">
               <a:spcBef>
                 <a:spcPts val="0"/>
               </a:spcBef>
@@ -15911,7 +16101,7 @@
                 <a:latin typeface="Cambria" panose="02040503050406030204" pitchFamily="18" charset="0"/>
                 <a:ea typeface="Cambria" panose="02040503050406030204" pitchFamily="18" charset="0"/>
               </a:rPr>
-              <a:t>Bedrooms misclassified as living rooms is the most misclassified class. This is likely because bedrooms and living rooms usually look similar with curtains and a soft, cushiony structure (bed or couch). In the next page, the first row shows bedrooms which were misclassified and the second row shows properly classified living rooms.</a:t>
+              <a:t>Bedrooms misclassified as living rooms is the most misclassified class. This is likely because bedrooms and living rooms usually look similar with curtains and a soft, cushiony structure (bed or couch). In the next page, the first row shows bedrooms which were misclassified as living rooms and the second row shows properly classified living rooms.</a:t>
             </a:r>
           </a:p>
           <a:p>

</xml_diff>